<commit_message>
final sub for pub
</commit_message>
<xml_diff>
--- a/paper/Submissions/PlantCell/TPC accepted sub/Figures/Figure 2.pptx
+++ b/paper/Submissions/PlantCell/TPC accepted sub/Figures/Figure 2.pptx
@@ -209,7 +209,7 @@
           <a:p>
             <a:fld id="{5C565908-5270-4969-9DF6-BEB77AF8793D}" type="datetimeFigureOut">
               <a:rPr lang="en-US" smtClean="0"/>
-              <a:t>8/15/2018</a:t>
+              <a:t>12/13/2018</a:t>
             </a:fld>
             <a:endParaRPr lang="en-US"/>
           </a:p>
@@ -764,7 +764,7 @@
           <a:p>
             <a:fld id="{CCE36AD2-7272-43A5-83B9-65017B25DD9B}" type="datetimeFigureOut">
               <a:rPr lang="en-US" smtClean="0"/>
-              <a:t>8/15/2018</a:t>
+              <a:t>12/13/2018</a:t>
             </a:fld>
             <a:endParaRPr lang="en-US"/>
           </a:p>
@@ -932,7 +932,7 @@
           <a:p>
             <a:fld id="{CCE36AD2-7272-43A5-83B9-65017B25DD9B}" type="datetimeFigureOut">
               <a:rPr lang="en-US" smtClean="0"/>
-              <a:t>8/15/2018</a:t>
+              <a:t>12/13/2018</a:t>
             </a:fld>
             <a:endParaRPr lang="en-US"/>
           </a:p>
@@ -1110,7 +1110,7 @@
           <a:p>
             <a:fld id="{CCE36AD2-7272-43A5-83B9-65017B25DD9B}" type="datetimeFigureOut">
               <a:rPr lang="en-US" smtClean="0"/>
-              <a:t>8/15/2018</a:t>
+              <a:t>12/13/2018</a:t>
             </a:fld>
             <a:endParaRPr lang="en-US"/>
           </a:p>
@@ -1278,7 +1278,7 @@
           <a:p>
             <a:fld id="{CCE36AD2-7272-43A5-83B9-65017B25DD9B}" type="datetimeFigureOut">
               <a:rPr lang="en-US" smtClean="0"/>
-              <a:t>8/15/2018</a:t>
+              <a:t>12/13/2018</a:t>
             </a:fld>
             <a:endParaRPr lang="en-US"/>
           </a:p>
@@ -1523,7 +1523,7 @@
           <a:p>
             <a:fld id="{CCE36AD2-7272-43A5-83B9-65017B25DD9B}" type="datetimeFigureOut">
               <a:rPr lang="en-US" smtClean="0"/>
-              <a:t>8/15/2018</a:t>
+              <a:t>12/13/2018</a:t>
             </a:fld>
             <a:endParaRPr lang="en-US"/>
           </a:p>
@@ -1808,7 +1808,7 @@
           <a:p>
             <a:fld id="{CCE36AD2-7272-43A5-83B9-65017B25DD9B}" type="datetimeFigureOut">
               <a:rPr lang="en-US" smtClean="0"/>
-              <a:t>8/15/2018</a:t>
+              <a:t>12/13/2018</a:t>
             </a:fld>
             <a:endParaRPr lang="en-US"/>
           </a:p>
@@ -2227,7 +2227,7 @@
           <a:p>
             <a:fld id="{CCE36AD2-7272-43A5-83B9-65017B25DD9B}" type="datetimeFigureOut">
               <a:rPr lang="en-US" smtClean="0"/>
-              <a:t>8/15/2018</a:t>
+              <a:t>12/13/2018</a:t>
             </a:fld>
             <a:endParaRPr lang="en-US"/>
           </a:p>
@@ -2344,7 +2344,7 @@
           <a:p>
             <a:fld id="{CCE36AD2-7272-43A5-83B9-65017B25DD9B}" type="datetimeFigureOut">
               <a:rPr lang="en-US" smtClean="0"/>
-              <a:t>8/15/2018</a:t>
+              <a:t>12/13/2018</a:t>
             </a:fld>
             <a:endParaRPr lang="en-US"/>
           </a:p>
@@ -2439,7 +2439,7 @@
           <a:p>
             <a:fld id="{CCE36AD2-7272-43A5-83B9-65017B25DD9B}" type="datetimeFigureOut">
               <a:rPr lang="en-US" smtClean="0"/>
-              <a:t>8/15/2018</a:t>
+              <a:t>12/13/2018</a:t>
             </a:fld>
             <a:endParaRPr lang="en-US"/>
           </a:p>
@@ -2714,7 +2714,7 @@
           <a:p>
             <a:fld id="{CCE36AD2-7272-43A5-83B9-65017B25DD9B}" type="datetimeFigureOut">
               <a:rPr lang="en-US" smtClean="0"/>
-              <a:t>8/15/2018</a:t>
+              <a:t>12/13/2018</a:t>
             </a:fld>
             <a:endParaRPr lang="en-US"/>
           </a:p>
@@ -2966,7 +2966,7 @@
           <a:p>
             <a:fld id="{CCE36AD2-7272-43A5-83B9-65017B25DD9B}" type="datetimeFigureOut">
               <a:rPr lang="en-US" smtClean="0"/>
-              <a:t>8/15/2018</a:t>
+              <a:t>12/13/2018</a:t>
             </a:fld>
             <a:endParaRPr lang="en-US"/>
           </a:p>
@@ -3177,7 +3177,7 @@
           <a:p>
             <a:fld id="{CCE36AD2-7272-43A5-83B9-65017B25DD9B}" type="datetimeFigureOut">
               <a:rPr lang="en-US" smtClean="0"/>
-              <a:t>8/15/2018</a:t>
+              <a:t>12/13/2018</a:t>
             </a:fld>
             <a:endParaRPr lang="en-US"/>
           </a:p>

</xml_diff>